<commit_message>
Almost done with the Data Acquisition
</commit_message>
<xml_diff>
--- a/assets/FiguresForFinalReport.pptx
+++ b/assets/FiguresForFinalReport.pptx
@@ -7,6 +7,7 @@
   <p:sldIdLst>
     <p:sldId id="256" r:id="rId3"/>
     <p:sldId id="257" r:id="rId4"/>
+    <p:sldId id="258" r:id="rId5"/>
   </p:sldIdLst>
   <p:sldSz cx="10080625" cy="5670550"/>
   <p:notesSz cx="7772400" cy="10058400"/>
@@ -2880,6 +2881,741 @@
           <p:childTnLst>
             <p:seq>
               <p:cTn id="4" dur="indefinite" nodeType="mainSeq"/>
+              <p:prevCondLst>
+                <p:cond delay="0" evt="onPrev">
+                  <p:tgtEl>
+                    <p:sldTgt/>
+                  </p:tgtEl>
+                </p:cond>
+              </p:prevCondLst>
+              <p:nextCondLst>
+                <p:cond delay="0" evt="onNext">
+                  <p:tgtEl>
+                    <p:sldTgt/>
+                  </p:tgtEl>
+                </p:cond>
+              </p:nextCondLst>
+            </p:seq>
+          </p:childTnLst>
+        </p:cTn>
+      </p:par>
+    </p:tnLst>
+  </p:timing>
+</p:sld>
+</file>
+
+<file path=ppt/slides/slide3.xml><?xml version="1.0" encoding="utf-8"?>
+<p:sld xmlns:a="http://schemas.openxmlformats.org/drawingml/2006/main" xmlns:p="http://schemas.openxmlformats.org/presentationml/2006/main" xmlns:r="http://schemas.openxmlformats.org/officeDocument/2006/relationships" xmlns:p14="http://schemas.microsoft.com/office/powerpoint/2010/main" xmlns:p15="http://schemas.microsoft.com/office/powerpoint/2012/main" xmlns:mc="http://schemas.openxmlformats.org/markup-compatibility/2006">
+  <p:cSld>
+    <p:spTree>
+      <p:nvGrpSpPr>
+        <p:cNvPr id="1" name=""/>
+        <p:cNvGrpSpPr/>
+        <p:nvPr/>
+      </p:nvGrpSpPr>
+      <p:grpSpPr>
+        <a:xfrm>
+          <a:off x="0" y="0"/>
+          <a:ext cx="0" cy="0"/>
+          <a:chOff x="0" y="0"/>
+          <a:chExt cx="0" cy="0"/>
+        </a:xfrm>
+      </p:grpSpPr>
+      <p:sp>
+        <p:nvSpPr>
+          <p:cNvPr id="74" name="TextShape 1"/>
+          <p:cNvSpPr txBox="1"/>
+          <p:nvPr/>
+        </p:nvSpPr>
+        <p:spPr>
+          <a:xfrm>
+            <a:off x="1097280" y="822960"/>
+            <a:ext cx="2011680" cy="346320"/>
+          </a:xfrm>
+          <a:prstGeom prst="rect">
+            <a:avLst/>
+          </a:prstGeom>
+          <a:noFill/>
+          <a:ln>
+            <a:noFill/>
+          </a:ln>
+        </p:spPr>
+      </p:sp>
+      <p:sp>
+        <p:nvSpPr>
+          <p:cNvPr id="75" name="CustomShape 2"/>
+          <p:cNvSpPr/>
+          <p:nvPr/>
+        </p:nvSpPr>
+        <p:spPr>
+          <a:xfrm>
+            <a:off x="1463040" y="1645920"/>
+            <a:ext cx="1280160" cy="640080"/>
+          </a:xfrm>
+          <a:prstGeom prst="rect">
+            <a:avLst/>
+          </a:prstGeom>
+          <a:noFill/>
+          <a:ln>
+            <a:solidFill>
+              <a:srgbClr val="000000"/>
+            </a:solidFill>
+          </a:ln>
+        </p:spPr>
+        <p:style>
+          <a:lnRef idx="0"/>
+          <a:fillRef idx="0"/>
+          <a:effectRef idx="0"/>
+          <a:fontRef idx="minor"/>
+        </p:style>
+      </p:sp>
+      <p:sp>
+        <p:nvSpPr>
+          <p:cNvPr id="76" name="TextShape 3"/>
+          <p:cNvSpPr txBox="1"/>
+          <p:nvPr/>
+        </p:nvSpPr>
+        <p:spPr>
+          <a:xfrm>
+            <a:off x="1645920" y="1737360"/>
+            <a:ext cx="914400" cy="431640"/>
+          </a:xfrm>
+          <a:prstGeom prst="rect">
+            <a:avLst/>
+          </a:prstGeom>
+          <a:noFill/>
+          <a:ln>
+            <a:noFill/>
+          </a:ln>
+        </p:spPr>
+        <p:txBody>
+          <a:bodyPr lIns="90000" rIns="90000" tIns="45000" bIns="45000"/>
+          <a:p>
+            <a:r>
+              <a:rPr b="0" lang="en-US" sz="1200" spc="-1" strike="noStrike">
+                <a:latin typeface="Arial"/>
+              </a:rPr>
+              <a:t>Source Code</a:t>
+            </a:r>
+            <a:endParaRPr b="0" lang="en-US" sz="1200" spc="-1" strike="noStrike">
+              <a:latin typeface="Arial"/>
+            </a:endParaRPr>
+          </a:p>
+        </p:txBody>
+      </p:sp>
+      <p:sp>
+        <p:nvSpPr>
+          <p:cNvPr id="77" name="CustomShape 4"/>
+          <p:cNvSpPr/>
+          <p:nvPr/>
+        </p:nvSpPr>
+        <p:spPr>
+          <a:xfrm>
+            <a:off x="1463040" y="1645920"/>
+            <a:ext cx="1280160" cy="640080"/>
+          </a:xfrm>
+          <a:prstGeom prst="rect">
+            <a:avLst/>
+          </a:prstGeom>
+          <a:noFill/>
+          <a:ln>
+            <a:solidFill>
+              <a:srgbClr val="000000"/>
+            </a:solidFill>
+          </a:ln>
+        </p:spPr>
+        <p:style>
+          <a:lnRef idx="0"/>
+          <a:fillRef idx="0"/>
+          <a:effectRef idx="0"/>
+          <a:fontRef idx="minor"/>
+        </p:style>
+      </p:sp>
+      <p:sp>
+        <p:nvSpPr>
+          <p:cNvPr id="78" name="TextShape 5"/>
+          <p:cNvSpPr txBox="1"/>
+          <p:nvPr/>
+        </p:nvSpPr>
+        <p:spPr>
+          <a:xfrm>
+            <a:off x="1645920" y="1737360"/>
+            <a:ext cx="914400" cy="431640"/>
+          </a:xfrm>
+          <a:prstGeom prst="rect">
+            <a:avLst/>
+          </a:prstGeom>
+          <a:noFill/>
+          <a:ln>
+            <a:noFill/>
+          </a:ln>
+        </p:spPr>
+        <p:txBody>
+          <a:bodyPr lIns="90000" rIns="90000" tIns="45000" bIns="45000"/>
+          <a:p>
+            <a:r>
+              <a:rPr b="0" lang="en-US" sz="1200" spc="-1" strike="noStrike">
+                <a:latin typeface="Arial"/>
+              </a:rPr>
+              <a:t>Source Code</a:t>
+            </a:r>
+            <a:endParaRPr b="0" lang="en-US" sz="1200" spc="-1" strike="noStrike">
+              <a:latin typeface="Arial"/>
+            </a:endParaRPr>
+          </a:p>
+        </p:txBody>
+      </p:sp>
+      <p:sp>
+        <p:nvSpPr>
+          <p:cNvPr id="79" name="CustomShape 6"/>
+          <p:cNvSpPr/>
+          <p:nvPr/>
+        </p:nvSpPr>
+        <p:spPr>
+          <a:xfrm>
+            <a:off x="3108960" y="1645920"/>
+            <a:ext cx="1280160" cy="640080"/>
+          </a:xfrm>
+          <a:prstGeom prst="rect">
+            <a:avLst/>
+          </a:prstGeom>
+          <a:noFill/>
+          <a:ln>
+            <a:solidFill>
+              <a:srgbClr val="000000"/>
+            </a:solidFill>
+          </a:ln>
+        </p:spPr>
+        <p:style>
+          <a:lnRef idx="0"/>
+          <a:fillRef idx="0"/>
+          <a:effectRef idx="0"/>
+          <a:fontRef idx="minor"/>
+        </p:style>
+      </p:sp>
+      <p:sp>
+        <p:nvSpPr>
+          <p:cNvPr id="80" name="CustomShape 7"/>
+          <p:cNvSpPr/>
+          <p:nvPr/>
+        </p:nvSpPr>
+        <p:spPr>
+          <a:xfrm>
+            <a:off x="3108960" y="1645920"/>
+            <a:ext cx="1280160" cy="640080"/>
+          </a:xfrm>
+          <a:prstGeom prst="rect">
+            <a:avLst/>
+          </a:prstGeom>
+          <a:noFill/>
+          <a:ln>
+            <a:solidFill>
+              <a:srgbClr val="000000"/>
+            </a:solidFill>
+          </a:ln>
+        </p:spPr>
+        <p:style>
+          <a:lnRef idx="0"/>
+          <a:fillRef idx="0"/>
+          <a:effectRef idx="0"/>
+          <a:fontRef idx="minor"/>
+        </p:style>
+      </p:sp>
+      <p:sp>
+        <p:nvSpPr>
+          <p:cNvPr id="81" name="CustomShape 8"/>
+          <p:cNvSpPr/>
+          <p:nvPr/>
+        </p:nvSpPr>
+        <p:spPr>
+          <a:xfrm>
+            <a:off x="4754880" y="1645920"/>
+            <a:ext cx="1280160" cy="640080"/>
+          </a:xfrm>
+          <a:prstGeom prst="rect">
+            <a:avLst/>
+          </a:prstGeom>
+          <a:noFill/>
+          <a:ln>
+            <a:solidFill>
+              <a:srgbClr val="000000"/>
+            </a:solidFill>
+          </a:ln>
+        </p:spPr>
+        <p:style>
+          <a:lnRef idx="0"/>
+          <a:fillRef idx="0"/>
+          <a:effectRef idx="0"/>
+          <a:fontRef idx="minor"/>
+        </p:style>
+      </p:sp>
+      <p:sp>
+        <p:nvSpPr>
+          <p:cNvPr id="82" name="TextShape 9"/>
+          <p:cNvSpPr txBox="1"/>
+          <p:nvPr/>
+        </p:nvSpPr>
+        <p:spPr>
+          <a:xfrm>
+            <a:off x="4937760" y="1683720"/>
+            <a:ext cx="914400" cy="602280"/>
+          </a:xfrm>
+          <a:prstGeom prst="rect">
+            <a:avLst/>
+          </a:prstGeom>
+          <a:noFill/>
+          <a:ln>
+            <a:noFill/>
+          </a:ln>
+        </p:spPr>
+        <p:txBody>
+          <a:bodyPr lIns="90000" rIns="90000" tIns="45000" bIns="45000"/>
+          <a:p>
+            <a:r>
+              <a:rPr b="0" lang="en-US" sz="1200" spc="-1" strike="noStrike">
+                <a:latin typeface="Arial"/>
+              </a:rPr>
+              <a:t>Directed Graph As JSON</a:t>
+            </a:r>
+            <a:endParaRPr b="0" lang="en-US" sz="1200" spc="-1" strike="noStrike">
+              <a:latin typeface="Arial"/>
+            </a:endParaRPr>
+          </a:p>
+        </p:txBody>
+      </p:sp>
+      <p:sp>
+        <p:nvSpPr>
+          <p:cNvPr id="83" name="CustomShape 10"/>
+          <p:cNvSpPr/>
+          <p:nvPr/>
+        </p:nvSpPr>
+        <p:spPr>
+          <a:xfrm>
+            <a:off x="4754880" y="1645920"/>
+            <a:ext cx="1280160" cy="640080"/>
+          </a:xfrm>
+          <a:prstGeom prst="rect">
+            <a:avLst/>
+          </a:prstGeom>
+          <a:noFill/>
+          <a:ln>
+            <a:solidFill>
+              <a:srgbClr val="000000"/>
+            </a:solidFill>
+          </a:ln>
+        </p:spPr>
+        <p:style>
+          <a:lnRef idx="0"/>
+          <a:fillRef idx="0"/>
+          <a:effectRef idx="0"/>
+          <a:fontRef idx="minor"/>
+        </p:style>
+      </p:sp>
+      <p:sp>
+        <p:nvSpPr>
+          <p:cNvPr id="84" name="CustomShape 11"/>
+          <p:cNvSpPr/>
+          <p:nvPr/>
+        </p:nvSpPr>
+        <p:spPr>
+          <a:xfrm>
+            <a:off x="6309360" y="1645920"/>
+            <a:ext cx="1280160" cy="640080"/>
+          </a:xfrm>
+          <a:prstGeom prst="rect">
+            <a:avLst/>
+          </a:prstGeom>
+          <a:noFill/>
+          <a:ln>
+            <a:solidFill>
+              <a:srgbClr val="000000"/>
+            </a:solidFill>
+          </a:ln>
+        </p:spPr>
+        <p:style>
+          <a:lnRef idx="0"/>
+          <a:fillRef idx="0"/>
+          <a:effectRef idx="0"/>
+          <a:fontRef idx="minor"/>
+        </p:style>
+      </p:sp>
+      <p:sp>
+        <p:nvSpPr>
+          <p:cNvPr id="85" name="TextShape 12"/>
+          <p:cNvSpPr txBox="1"/>
+          <p:nvPr/>
+        </p:nvSpPr>
+        <p:spPr>
+          <a:xfrm>
+            <a:off x="6492240" y="1737360"/>
+            <a:ext cx="914400" cy="431640"/>
+          </a:xfrm>
+          <a:prstGeom prst="rect">
+            <a:avLst/>
+          </a:prstGeom>
+          <a:noFill/>
+          <a:ln>
+            <a:noFill/>
+          </a:ln>
+        </p:spPr>
+        <p:txBody>
+          <a:bodyPr lIns="90000" rIns="90000" tIns="45000" bIns="45000"/>
+          <a:p>
+            <a:r>
+              <a:rPr b="0" lang="en-US" sz="1200" spc="-1" strike="noStrike">
+                <a:latin typeface="Arial"/>
+              </a:rPr>
+              <a:t>Splitting Data</a:t>
+            </a:r>
+            <a:endParaRPr b="0" lang="en-US" sz="1200" spc="-1" strike="noStrike">
+              <a:latin typeface="Arial"/>
+            </a:endParaRPr>
+          </a:p>
+        </p:txBody>
+      </p:sp>
+      <p:sp>
+        <p:nvSpPr>
+          <p:cNvPr id="86" name="CustomShape 13"/>
+          <p:cNvSpPr/>
+          <p:nvPr/>
+        </p:nvSpPr>
+        <p:spPr>
+          <a:xfrm>
+            <a:off x="6309360" y="1645920"/>
+            <a:ext cx="1280160" cy="640080"/>
+          </a:xfrm>
+          <a:prstGeom prst="rect">
+            <a:avLst/>
+          </a:prstGeom>
+          <a:noFill/>
+          <a:ln>
+            <a:solidFill>
+              <a:srgbClr val="000000"/>
+            </a:solidFill>
+          </a:ln>
+        </p:spPr>
+        <p:style>
+          <a:lnRef idx="0"/>
+          <a:fillRef idx="0"/>
+          <a:effectRef idx="0"/>
+          <a:fontRef idx="minor"/>
+        </p:style>
+      </p:sp>
+      <p:sp>
+        <p:nvSpPr>
+          <p:cNvPr id="87" name="TextShape 14"/>
+          <p:cNvSpPr txBox="1"/>
+          <p:nvPr/>
+        </p:nvSpPr>
+        <p:spPr>
+          <a:xfrm>
+            <a:off x="3383280" y="1828800"/>
+            <a:ext cx="914400" cy="261000"/>
+          </a:xfrm>
+          <a:prstGeom prst="rect">
+            <a:avLst/>
+          </a:prstGeom>
+          <a:noFill/>
+          <a:ln>
+            <a:noFill/>
+          </a:ln>
+        </p:spPr>
+        <p:txBody>
+          <a:bodyPr lIns="90000" rIns="90000" tIns="45000" bIns="45000"/>
+          <a:p>
+            <a:r>
+              <a:rPr b="0" lang="en-US" sz="1200" spc="-1" strike="noStrike">
+                <a:latin typeface="Arial"/>
+              </a:rPr>
+              <a:t>AST</a:t>
+            </a:r>
+            <a:endParaRPr b="0" lang="en-US" sz="1200" spc="-1" strike="noStrike">
+              <a:latin typeface="Arial"/>
+            </a:endParaRPr>
+          </a:p>
+        </p:txBody>
+      </p:sp>
+      <p:sp>
+        <p:nvSpPr>
+          <p:cNvPr id="88" name="TextShape 15"/>
+          <p:cNvSpPr txBox="1"/>
+          <p:nvPr/>
+        </p:nvSpPr>
+        <p:spPr>
+          <a:xfrm>
+            <a:off x="4937760" y="860760"/>
+            <a:ext cx="1097280" cy="772920"/>
+          </a:xfrm>
+          <a:prstGeom prst="rect">
+            <a:avLst/>
+          </a:prstGeom>
+          <a:noFill/>
+          <a:ln>
+            <a:noFill/>
+          </a:ln>
+        </p:spPr>
+        <p:txBody>
+          <a:bodyPr lIns="90000" rIns="90000" tIns="45000" bIns="45000"/>
+          <a:p>
+            <a:r>
+              <a:rPr b="0" lang="en-US" sz="1200" spc="-1" strike="noStrike">
+                <a:latin typeface="Arial"/>
+              </a:rPr>
+              <a:t>Type Hierarchy Information</a:t>
+            </a:r>
+            <a:endParaRPr b="0" lang="en-US" sz="1200" spc="-1" strike="noStrike">
+              <a:latin typeface="Arial"/>
+            </a:endParaRPr>
+          </a:p>
+        </p:txBody>
+      </p:sp>
+      <p:sp>
+        <p:nvSpPr>
+          <p:cNvPr id="89" name="CustomShape 16"/>
+          <p:cNvSpPr/>
+          <p:nvPr/>
+        </p:nvSpPr>
+        <p:spPr>
+          <a:xfrm>
+            <a:off x="4754880" y="822960"/>
+            <a:ext cx="1280160" cy="640080"/>
+          </a:xfrm>
+          <a:prstGeom prst="rect">
+            <a:avLst/>
+          </a:prstGeom>
+          <a:noFill/>
+          <a:ln>
+            <a:solidFill>
+              <a:srgbClr val="000000"/>
+            </a:solidFill>
+          </a:ln>
+        </p:spPr>
+        <p:style>
+          <a:lnRef idx="0"/>
+          <a:fillRef idx="0"/>
+          <a:effectRef idx="0"/>
+          <a:fontRef idx="minor"/>
+        </p:style>
+      </p:sp>
+      <p:sp>
+        <p:nvSpPr>
+          <p:cNvPr id="90" name="Line 17"/>
+          <p:cNvSpPr/>
+          <p:nvPr/>
+        </p:nvSpPr>
+        <p:spPr>
+          <a:xfrm>
+            <a:off x="2743200" y="2011680"/>
+            <a:ext cx="365760" cy="0"/>
+          </a:xfrm>
+          <a:prstGeom prst="line">
+            <a:avLst/>
+          </a:prstGeom>
+          <a:ln>
+            <a:solidFill>
+              <a:srgbClr val="000000"/>
+            </a:solidFill>
+            <a:tailEnd len="med" type="triangle" w="med"/>
+          </a:ln>
+        </p:spPr>
+        <p:style>
+          <a:lnRef idx="0"/>
+          <a:fillRef idx="0"/>
+          <a:effectRef idx="0"/>
+          <a:fontRef idx="minor"/>
+        </p:style>
+      </p:sp>
+      <p:sp>
+        <p:nvSpPr>
+          <p:cNvPr id="91" name="Line 18"/>
+          <p:cNvSpPr/>
+          <p:nvPr/>
+        </p:nvSpPr>
+        <p:spPr>
+          <a:xfrm>
+            <a:off x="4389120" y="2011680"/>
+            <a:ext cx="365760" cy="0"/>
+          </a:xfrm>
+          <a:prstGeom prst="line">
+            <a:avLst/>
+          </a:prstGeom>
+          <a:ln>
+            <a:solidFill>
+              <a:srgbClr val="000000"/>
+            </a:solidFill>
+            <a:tailEnd len="med" type="triangle" w="med"/>
+          </a:ln>
+        </p:spPr>
+        <p:style>
+          <a:lnRef idx="0"/>
+          <a:fillRef idx="0"/>
+          <a:effectRef idx="0"/>
+          <a:fontRef idx="minor"/>
+        </p:style>
+      </p:sp>
+      <p:sp>
+        <p:nvSpPr>
+          <p:cNvPr id="92" name="Line 19"/>
+          <p:cNvSpPr/>
+          <p:nvPr/>
+        </p:nvSpPr>
+        <p:spPr>
+          <a:xfrm flipV="1">
+            <a:off x="4389120" y="1463040"/>
+            <a:ext cx="365760" cy="548640"/>
+          </a:xfrm>
+          <a:prstGeom prst="line">
+            <a:avLst/>
+          </a:prstGeom>
+          <a:ln>
+            <a:solidFill>
+              <a:srgbClr val="000000"/>
+            </a:solidFill>
+            <a:tailEnd len="med" type="triangle" w="med"/>
+          </a:ln>
+        </p:spPr>
+        <p:style>
+          <a:lnRef idx="0"/>
+          <a:fillRef idx="0"/>
+          <a:effectRef idx="0"/>
+          <a:fontRef idx="minor"/>
+        </p:style>
+      </p:sp>
+      <p:sp>
+        <p:nvSpPr>
+          <p:cNvPr id="93" name="CustomShape 20"/>
+          <p:cNvSpPr/>
+          <p:nvPr/>
+        </p:nvSpPr>
+        <p:spPr>
+          <a:xfrm>
+            <a:off x="7863840" y="1645920"/>
+            <a:ext cx="1280160" cy="640080"/>
+          </a:xfrm>
+          <a:prstGeom prst="rect">
+            <a:avLst/>
+          </a:prstGeom>
+          <a:noFill/>
+          <a:ln>
+            <a:solidFill>
+              <a:srgbClr val="000000"/>
+            </a:solidFill>
+          </a:ln>
+        </p:spPr>
+        <p:style>
+          <a:lnRef idx="0"/>
+          <a:fillRef idx="0"/>
+          <a:effectRef idx="0"/>
+          <a:fontRef idx="minor"/>
+        </p:style>
+      </p:sp>
+      <p:sp>
+        <p:nvSpPr>
+          <p:cNvPr id="94" name="TextShape 21"/>
+          <p:cNvSpPr txBox="1"/>
+          <p:nvPr/>
+        </p:nvSpPr>
+        <p:spPr>
+          <a:xfrm>
+            <a:off x="8046720" y="1737360"/>
+            <a:ext cx="914400" cy="431640"/>
+          </a:xfrm>
+          <a:prstGeom prst="rect">
+            <a:avLst/>
+          </a:prstGeom>
+          <a:noFill/>
+          <a:ln>
+            <a:noFill/>
+          </a:ln>
+        </p:spPr>
+        <p:txBody>
+          <a:bodyPr lIns="90000" rIns="90000" tIns="45000" bIns="45000"/>
+          <a:p>
+            <a:r>
+              <a:rPr b="0" lang="en-US" sz="1200" spc="-1" strike="noStrike">
+                <a:latin typeface="Arial"/>
+              </a:rPr>
+              <a:t>Zipped Result</a:t>
+            </a:r>
+            <a:endParaRPr b="0" lang="en-US" sz="1200" spc="-1" strike="noStrike">
+              <a:latin typeface="Arial"/>
+            </a:endParaRPr>
+          </a:p>
+        </p:txBody>
+      </p:sp>
+      <p:sp>
+        <p:nvSpPr>
+          <p:cNvPr id="95" name="Line 22"/>
+          <p:cNvSpPr/>
+          <p:nvPr/>
+        </p:nvSpPr>
+        <p:spPr>
+          <a:xfrm>
+            <a:off x="6035040" y="1920240"/>
+            <a:ext cx="274320" cy="0"/>
+          </a:xfrm>
+          <a:prstGeom prst="line">
+            <a:avLst/>
+          </a:prstGeom>
+          <a:ln>
+            <a:solidFill>
+              <a:srgbClr val="000000"/>
+            </a:solidFill>
+            <a:tailEnd len="med" type="triangle" w="med"/>
+          </a:ln>
+        </p:spPr>
+        <p:style>
+          <a:lnRef idx="0"/>
+          <a:fillRef idx="0"/>
+          <a:effectRef idx="0"/>
+          <a:fontRef idx="minor"/>
+        </p:style>
+      </p:sp>
+      <p:sp>
+        <p:nvSpPr>
+          <p:cNvPr id="96" name="Line 23"/>
+          <p:cNvSpPr/>
+          <p:nvPr/>
+        </p:nvSpPr>
+        <p:spPr>
+          <a:xfrm>
+            <a:off x="7589520" y="1920240"/>
+            <a:ext cx="274320" cy="0"/>
+          </a:xfrm>
+          <a:prstGeom prst="line">
+            <a:avLst/>
+          </a:prstGeom>
+          <a:ln>
+            <a:solidFill>
+              <a:srgbClr val="000000"/>
+            </a:solidFill>
+            <a:tailEnd len="med" type="triangle" w="med"/>
+          </a:ln>
+        </p:spPr>
+        <p:style>
+          <a:lnRef idx="0"/>
+          <a:fillRef idx="0"/>
+          <a:effectRef idx="0"/>
+          <a:fontRef idx="minor"/>
+        </p:style>
+      </p:sp>
+    </p:spTree>
+  </p:cSld>
+  <mc:AlternateContent>
+    <mc:Choice Requires="p14">
+      <p:transition spd="slow" p14:dur="2000"/>
+    </mc:Choice>
+    <mc:Fallback>
+      <p:transition spd="slow"/>
+    </mc:Fallback>
+  </mc:AlternateContent>
+  <p:timing>
+    <p:tnLst>
+      <p:par>
+        <p:cTn id="5" dur="indefinite" restart="never" nodeType="tmRoot">
+          <p:childTnLst>
+            <p:seq>
+              <p:cTn id="6" dur="indefinite" nodeType="mainSeq"/>
               <p:prevCondLst>
                 <p:cond delay="0" evt="onPrev">
                   <p:tgtEl>

</xml_diff>

<commit_message>
Done - need to format
</commit_message>
<xml_diff>
--- a/assets/FiguresForFinalReport.pptx
+++ b/assets/FiguresForFinalReport.pptx
@@ -5137,6 +5137,63 @@
           <a:effectRef idx="0"/>
           <a:fontRef idx="minor"/>
         </p:style>
+      </p:sp>
+      <p:cxnSp>
+        <p:nvCxnSpPr>
+          <p:cNvPr id="138" name="Line 28"/>
+          <p:cNvCxnSpPr/>
+          <p:nvPr/>
+        </p:nvCxnSpPr>
+        <p:spPr>
+          <a:xfrm flipV="1">
+            <a:off x="5268600" y="3996000"/>
+            <a:ext cx="379800" cy="647640"/>
+          </a:xfrm>
+          <a:prstGeom prst="straightConnector1">
+            <a:avLst/>
+          </a:prstGeom>
+          <a:ln>
+            <a:solidFill>
+              <a:srgbClr val="000000"/>
+            </a:solidFill>
+            <a:tailEnd len="med" type="triangle" w="med"/>
+          </a:ln>
+        </p:spPr>
+      </p:cxnSp>
+      <p:sp>
+        <p:nvSpPr>
+          <p:cNvPr id="139" name="TextShape 29"/>
+          <p:cNvSpPr txBox="1"/>
+          <p:nvPr/>
+        </p:nvSpPr>
+        <p:spPr>
+          <a:xfrm>
+            <a:off x="4297680" y="4597560"/>
+            <a:ext cx="1920240" cy="431640"/>
+          </a:xfrm>
+          <a:prstGeom prst="rect">
+            <a:avLst/>
+          </a:prstGeom>
+          <a:noFill/>
+          <a:ln>
+            <a:noFill/>
+          </a:ln>
+        </p:spPr>
+        <p:txBody>
+          <a:bodyPr lIns="90000" rIns="90000" tIns="45000" bIns="45000"/>
+          <a:p>
+            <a:pPr algn="ctr"/>
+            <a:r>
+              <a:rPr b="0" lang="en-US" sz="1200" spc="-1" strike="noStrike">
+                <a:latin typeface="Arial"/>
+              </a:rPr>
+              <a:t>tf-gnn-samples</a:t>
+            </a:r>
+            <a:endParaRPr b="0" lang="en-US" sz="1200" spc="-1" strike="noStrike">
+              <a:latin typeface="Arial"/>
+            </a:endParaRPr>
+          </a:p>
+        </p:txBody>
       </p:sp>
     </p:spTree>
   </p:cSld>

</xml_diff>